<commit_message>
DeveloperGuide: update section on UndoRedoStack to VersionedAddressBook
The app previously uses UndoRedoStack which stores the UndoableCommands
in LogicManager for the undo/redo mechanism.

Since the undo/redo machanism has been shifted to VersionedAddressBook
which stores ReadOnlyAddressBook in a List, and has been moved to Model
layer instead, the sections on undo/redo feature, Logic and Model
component in DeveloperGuide is out of date.

Also, commands that do not mutate the address book, such as
FindCommand and ListCommand, will no longer clear the redoable
address book states. This allows for redo commands to pass when we
undo commands and execute a non-mutating command afterwards.

UndoableCommand has also been removed from the codebase as well.

Let's update the out of date sections in the DeveloperGuide, such
as switching from UndoRedoStack to the updated VersionedAddressBook,
how the undo/redo mechanism works, and remove any reference
to UndoableCommand in DeveloperGuide.
</commit_message>
<xml_diff>
--- a/docs/diagrams/LogicComponentClassDiagram.pptx
+++ b/docs/diagrams/LogicComponentClassDiagram.pptx
@@ -212,7 +212,7 @@
           <a:p>
             <a:fld id="{F5CC4B3F-88C1-4FFA-B1B6-F41C21DC6924}" type="datetimeFigureOut">
               <a:rPr lang="en-US" smtClean="0"/>
-              <a:t>7/20/17</a:t>
+              <a:t>4/16/2018</a:t>
             </a:fld>
             <a:endParaRPr lang="en-US"/>
           </a:p>
@@ -658,7 +658,7 @@
           <a:p>
             <a:fld id="{78C97017-6FC3-485B-9764-EAC9E56C1D49}" type="datetimeFigureOut">
               <a:rPr lang="en-US" smtClean="0"/>
-              <a:t>7/20/17</a:t>
+              <a:t>4/16/2018</a:t>
             </a:fld>
             <a:endParaRPr lang="en-US"/>
           </a:p>
@@ -826,7 +826,7 @@
           <a:p>
             <a:fld id="{78C97017-6FC3-485B-9764-EAC9E56C1D49}" type="datetimeFigureOut">
               <a:rPr lang="en-US" smtClean="0"/>
-              <a:t>7/20/17</a:t>
+              <a:t>4/16/2018</a:t>
             </a:fld>
             <a:endParaRPr lang="en-US"/>
           </a:p>
@@ -1004,7 +1004,7 @@
           <a:p>
             <a:fld id="{78C97017-6FC3-485B-9764-EAC9E56C1D49}" type="datetimeFigureOut">
               <a:rPr lang="en-US" smtClean="0"/>
-              <a:t>7/20/17</a:t>
+              <a:t>4/16/2018</a:t>
             </a:fld>
             <a:endParaRPr lang="en-US"/>
           </a:p>
@@ -1172,7 +1172,7 @@
           <a:p>
             <a:fld id="{78C97017-6FC3-485B-9764-EAC9E56C1D49}" type="datetimeFigureOut">
               <a:rPr lang="en-US" smtClean="0"/>
-              <a:t>7/20/17</a:t>
+              <a:t>4/16/2018</a:t>
             </a:fld>
             <a:endParaRPr lang="en-US"/>
           </a:p>
@@ -1417,7 +1417,7 @@
           <a:p>
             <a:fld id="{78C97017-6FC3-485B-9764-EAC9E56C1D49}" type="datetimeFigureOut">
               <a:rPr lang="en-US" smtClean="0"/>
-              <a:t>7/20/17</a:t>
+              <a:t>4/16/2018</a:t>
             </a:fld>
             <a:endParaRPr lang="en-US"/>
           </a:p>
@@ -1702,7 +1702,7 @@
           <a:p>
             <a:fld id="{78C97017-6FC3-485B-9764-EAC9E56C1D49}" type="datetimeFigureOut">
               <a:rPr lang="en-US" smtClean="0"/>
-              <a:t>7/20/17</a:t>
+              <a:t>4/16/2018</a:t>
             </a:fld>
             <a:endParaRPr lang="en-US"/>
           </a:p>
@@ -2121,7 +2121,7 @@
           <a:p>
             <a:fld id="{78C97017-6FC3-485B-9764-EAC9E56C1D49}" type="datetimeFigureOut">
               <a:rPr lang="en-US" smtClean="0"/>
-              <a:t>7/20/17</a:t>
+              <a:t>4/16/2018</a:t>
             </a:fld>
             <a:endParaRPr lang="en-US"/>
           </a:p>
@@ -2238,7 +2238,7 @@
           <a:p>
             <a:fld id="{78C97017-6FC3-485B-9764-EAC9E56C1D49}" type="datetimeFigureOut">
               <a:rPr lang="en-US" smtClean="0"/>
-              <a:t>7/20/17</a:t>
+              <a:t>4/16/2018</a:t>
             </a:fld>
             <a:endParaRPr lang="en-US"/>
           </a:p>
@@ -2333,7 +2333,7 @@
           <a:p>
             <a:fld id="{78C97017-6FC3-485B-9764-EAC9E56C1D49}" type="datetimeFigureOut">
               <a:rPr lang="en-US" smtClean="0"/>
-              <a:t>7/20/17</a:t>
+              <a:t>4/16/2018</a:t>
             </a:fld>
             <a:endParaRPr lang="en-US"/>
           </a:p>
@@ -2608,7 +2608,7 @@
           <a:p>
             <a:fld id="{78C97017-6FC3-485B-9764-EAC9E56C1D49}" type="datetimeFigureOut">
               <a:rPr lang="en-US" smtClean="0"/>
-              <a:t>7/20/17</a:t>
+              <a:t>4/16/2018</a:t>
             </a:fld>
             <a:endParaRPr lang="en-US"/>
           </a:p>
@@ -2860,7 +2860,7 @@
           <a:p>
             <a:fld id="{78C97017-6FC3-485B-9764-EAC9E56C1D49}" type="datetimeFigureOut">
               <a:rPr lang="en-US" smtClean="0"/>
-              <a:t>7/20/17</a:t>
+              <a:t>4/16/2018</a:t>
             </a:fld>
             <a:endParaRPr lang="en-US"/>
           </a:p>
@@ -3071,7 +3071,7 @@
           <a:p>
             <a:fld id="{78C97017-6FC3-485B-9764-EAC9E56C1D49}" type="datetimeFigureOut">
               <a:rPr lang="en-US" smtClean="0"/>
-              <a:t>7/20/17</a:t>
+              <a:t>4/16/2018</a:t>
             </a:fld>
             <a:endParaRPr lang="en-US"/>
           </a:p>
@@ -5517,7 +5517,7 @@
           <p:cNvPr id="97" name="Rectangle 96">
             <a:extLst>
               <a:ext uri="{FF2B5EF4-FFF2-40B4-BE49-F238E27FC236}">
-                <a16:creationId xmlns="" xmlns:a16="http://schemas.microsoft.com/office/drawing/2014/main" id="{AADE6A0C-89AB-467B-8CEA-5FCF36CE0D21}"/>
+                <a16:creationId xmlns:a16="http://schemas.microsoft.com/office/drawing/2014/main" id="{AADE6A0C-89AB-467B-8CEA-5FCF36CE0D21}"/>
               </a:ext>
             </a:extLst>
           </p:cNvPr>
@@ -6215,160 +6215,6 @@
             <a:endParaRPr lang="en-US" sz="1050" dirty="0">
               <a:solidFill>
                 <a:schemeClr val="bg1"/>
-              </a:solidFill>
-            </a:endParaRPr>
-          </a:p>
-        </p:txBody>
-      </p:sp>
-      <p:sp>
-        <p:nvSpPr>
-          <p:cNvPr id="59" name="Rectangle 62"/>
-          <p:cNvSpPr/>
-          <p:nvPr/>
-        </p:nvSpPr>
-        <p:spPr>
-          <a:xfrm>
-            <a:off x="2334221" y="3058789"/>
-            <a:ext cx="758695" cy="346760"/>
-          </a:xfrm>
-          <a:prstGeom prst="rect">
-            <a:avLst/>
-          </a:prstGeom>
-          <a:solidFill>
-            <a:srgbClr val="0070C0"/>
-          </a:solidFill>
-          <a:ln w="19050">
-            <a:solidFill>
-              <a:srgbClr val="0070C0"/>
-            </a:solidFill>
-          </a:ln>
-          <a:effectLst/>
-        </p:spPr>
-        <p:style>
-          <a:lnRef idx="1">
-            <a:schemeClr val="accent2"/>
-          </a:lnRef>
-          <a:fillRef idx="2">
-            <a:schemeClr val="accent2"/>
-          </a:fillRef>
-          <a:effectRef idx="1">
-            <a:schemeClr val="accent2"/>
-          </a:effectRef>
-          <a:fontRef idx="minor">
-            <a:schemeClr val="dk1"/>
-          </a:fontRef>
-        </p:style>
-        <p:txBody>
-          <a:bodyPr rtlCol="0" anchor="ctr"/>
-          <a:lstStyle/>
-          <a:p>
-            <a:pPr algn="ctr"/>
-            <a:r>
-              <a:rPr lang="en-US" sz="1050" dirty="0" err="1" smtClean="0">
-                <a:solidFill>
-                  <a:schemeClr val="bg1"/>
-                </a:solidFill>
-              </a:rPr>
-              <a:t>UndoRedo</a:t>
-            </a:r>
-            <a:endParaRPr lang="en-US" sz="1050" dirty="0" smtClean="0">
-              <a:solidFill>
-                <a:schemeClr val="bg1"/>
-              </a:solidFill>
-            </a:endParaRPr>
-          </a:p>
-          <a:p>
-            <a:pPr algn="ctr"/>
-            <a:r>
-              <a:rPr lang="en-US" sz="1050" dirty="0" smtClean="0">
-                <a:solidFill>
-                  <a:schemeClr val="bg1"/>
-                </a:solidFill>
-              </a:rPr>
-              <a:t>Stack</a:t>
-            </a:r>
-            <a:endParaRPr lang="en-SG" sz="1050" dirty="0">
-              <a:solidFill>
-                <a:schemeClr val="bg1"/>
-              </a:solidFill>
-            </a:endParaRPr>
-          </a:p>
-        </p:txBody>
-      </p:sp>
-      <p:cxnSp>
-        <p:nvCxnSpPr>
-          <p:cNvPr id="61" name="Straight Arrow Connector 57"/>
-          <p:cNvCxnSpPr>
-            <a:endCxn id="59" idx="2"/>
-          </p:cNvCxnSpPr>
-          <p:nvPr/>
-        </p:nvCxnSpPr>
-        <p:spPr>
-          <a:xfrm flipV="1">
-            <a:off x="2713568" y="3405549"/>
-            <a:ext cx="1" cy="177981"/>
-          </a:xfrm>
-          <a:prstGeom prst="straightConnector1">
-            <a:avLst/>
-          </a:prstGeom>
-          <a:ln w="19050">
-            <a:solidFill>
-              <a:srgbClr val="0070C0"/>
-            </a:solidFill>
-            <a:headEnd type="none" w="med" len="med"/>
-            <a:tailEnd type="arrow" w="med" len="med"/>
-          </a:ln>
-          <a:effectLst/>
-        </p:spPr>
-        <p:style>
-          <a:lnRef idx="1">
-            <a:schemeClr val="accent2"/>
-          </a:lnRef>
-          <a:fillRef idx="2">
-            <a:schemeClr val="accent2"/>
-          </a:fillRef>
-          <a:effectRef idx="1">
-            <a:schemeClr val="accent2"/>
-          </a:effectRef>
-          <a:fontRef idx="minor">
-            <a:schemeClr val="dk1"/>
-          </a:fontRef>
-        </p:style>
-      </p:cxnSp>
-      <p:sp>
-        <p:nvSpPr>
-          <p:cNvPr id="63" name="TextBox 62"/>
-          <p:cNvSpPr txBox="1"/>
-          <p:nvPr/>
-        </p:nvSpPr>
-        <p:spPr>
-          <a:xfrm>
-            <a:off x="2724741" y="3418256"/>
-            <a:ext cx="131116" cy="230832"/>
-          </a:xfrm>
-          <a:prstGeom prst="rect">
-            <a:avLst/>
-          </a:prstGeom>
-          <a:noFill/>
-        </p:spPr>
-        <p:txBody>
-          <a:bodyPr wrap="square" lIns="0" tIns="0" rIns="0" bIns="0" rtlCol="0">
-            <a:noAutofit/>
-          </a:bodyPr>
-          <a:lstStyle/>
-          <a:p>
-            <a:pPr algn="r"/>
-            <a:r>
-              <a:rPr lang="en-US" sz="1100" dirty="0">
-                <a:solidFill>
-                  <a:srgbClr val="0070C0"/>
-                </a:solidFill>
-              </a:rPr>
-              <a:t>1</a:t>
-            </a:r>
-            <a:endParaRPr lang="en-SG" sz="1100" dirty="0">
-              <a:solidFill>
-                <a:srgbClr val="0070C0"/>
               </a:solidFill>
             </a:endParaRPr>
           </a:p>

</xml_diff>